<commit_message>
finish first version until session 4
</commit_message>
<xml_diff>
--- a/Session2/Session2.pptx
+++ b/Session2/Session2.pptx
@@ -4624,23 +4624,14 @@
           <a:p>
             <a:pPr lvl="1"/>
             <a:r>
+              <a:rPr lang="en-US" sz="2000"/>
+              <a:t>Event </a:t>
+            </a:r>
+            <a:r>
               <a:rPr lang="en-US" sz="2000" dirty="0"/>
-              <a:t>Attribute binding</a:t>
-            </a:r>
-          </a:p>
-          <a:p>
-            <a:pPr lvl="1"/>
-            <a:r>
-              <a:rPr lang="en-US" sz="2000" dirty="0"/>
-              <a:t>Event binding</a:t>
+              <a:t>binding</a:t>
             </a:r>
             <a:endParaRPr lang="de-DE" sz="2000" dirty="0"/>
-          </a:p>
-          <a:p>
-            <a:r>
-              <a:rPr lang="de-DE" dirty="0"/>
-              <a:t>Two Way binding</a:t>
-            </a:r>
           </a:p>
           <a:p>
             <a:r>

</xml_diff>